<commit_message>
updated visualisations to reflect fixed-seed simulation
</commit_message>
<xml_diff>
--- a/results/IceCreamReport.pptx
+++ b/results/IceCreamReport.pptx
@@ -3335,7 +3335,7 @@
                 <a:ea typeface="Segoe UI" charset="0"/>
                 <a:cs typeface="Segoe UI" charset="0"/>
               </a:rPr>
-              <a:t>7/6/2020 6:49:53 PM AUS Eastern Standard Time</a:t>
+              <a:t>9/3/2020 11:20:01 AM AUS Eastern Standard Time</a:t>
             </a:r>
           </a:p>
         </p:txBody>
@@ -3392,7 +3392,7 @@
                 <a:ea typeface="Segoe UI" charset="0"/>
                 <a:cs typeface="Segoe UI" charset="0"/>
               </a:rPr>
-              <a:t>7/6/2020 12:57:08 AM AUS Eastern Standard Time</a:t>
+              <a:t>9/3/2020 10:11:25 AM AUS Eastern Standard Time</a:t>
             </a:r>
             <a:endParaRPr lang="en-US" sz="900" b="0" i="0" dirty="0" smtClean="0">
               <a:solidFill>
@@ -3506,7 +3506,7 @@
           <p:nvPr/>
         </p:nvPicPr>
         <p:blipFill>
-          <a:blip xmlns:r="http://schemas.openxmlformats.org/officeDocument/2006/relationships" xmlns:a="http://schemas.openxmlformats.org/drawingml/2006/main" r:embed="imgId51451847"/>
+          <a:blip xmlns:r="http://schemas.openxmlformats.org/officeDocument/2006/relationships" xmlns:a="http://schemas.openxmlformats.org/drawingml/2006/main" r:embed="imgId56434805"/>
           <a:stretch xmlns:a="http://schemas.openxmlformats.org/drawingml/2006/main">
             <a:fillRect/>
           </a:stretch>
@@ -3551,7 +3551,7 @@
           <p:nvPr/>
         </p:nvPicPr>
         <p:blipFill>
-          <a:blip xmlns:r="http://schemas.openxmlformats.org/officeDocument/2006/relationships" xmlns:a="http://schemas.openxmlformats.org/drawingml/2006/main" r:embed="imgId51451848"/>
+          <a:blip xmlns:r="http://schemas.openxmlformats.org/officeDocument/2006/relationships" xmlns:a="http://schemas.openxmlformats.org/drawingml/2006/main" r:embed="imgId56434806"/>
           <a:stretch xmlns:a="http://schemas.openxmlformats.org/drawingml/2006/main">
             <a:fillRect/>
           </a:stretch>
@@ -3596,7 +3596,7 @@
           <p:nvPr/>
         </p:nvPicPr>
         <p:blipFill>
-          <a:blip xmlns:r="http://schemas.openxmlformats.org/officeDocument/2006/relationships" xmlns:a="http://schemas.openxmlformats.org/drawingml/2006/main" r:embed="imgId51453144"/>
+          <a:blip xmlns:r="http://schemas.openxmlformats.org/officeDocument/2006/relationships" xmlns:a="http://schemas.openxmlformats.org/drawingml/2006/main" r:embed="imgId56434807"/>
           <a:stretch xmlns:a="http://schemas.openxmlformats.org/drawingml/2006/main">
             <a:fillRect/>
           </a:stretch>
@@ -3641,7 +3641,7 @@
           <p:nvPr/>
         </p:nvPicPr>
         <p:blipFill>
-          <a:blip xmlns:r="http://schemas.openxmlformats.org/officeDocument/2006/relationships" xmlns:a="http://schemas.openxmlformats.org/drawingml/2006/main" r:embed="imgId51460558"/>
+          <a:blip xmlns:r="http://schemas.openxmlformats.org/officeDocument/2006/relationships" xmlns:a="http://schemas.openxmlformats.org/drawingml/2006/main" r:embed="imgId56434808"/>
           <a:stretch xmlns:a="http://schemas.openxmlformats.org/drawingml/2006/main">
             <a:fillRect/>
           </a:stretch>
@@ -3686,7 +3686,7 @@
           <p:nvPr/>
         </p:nvPicPr>
         <p:blipFill>
-          <a:blip xmlns:r="http://schemas.openxmlformats.org/officeDocument/2006/relationships" xmlns:a="http://schemas.openxmlformats.org/drawingml/2006/main" r:embed="imgId51460557"/>
+          <a:blip xmlns:r="http://schemas.openxmlformats.org/officeDocument/2006/relationships" xmlns:a="http://schemas.openxmlformats.org/drawingml/2006/main" r:embed="imgId56434809"/>
           <a:stretch xmlns:a="http://schemas.openxmlformats.org/drawingml/2006/main">
             <a:fillRect/>
           </a:stretch>
@@ -3731,7 +3731,7 @@
           <p:nvPr/>
         </p:nvPicPr>
         <p:blipFill>
-          <a:blip xmlns:r="http://schemas.openxmlformats.org/officeDocument/2006/relationships" xmlns:a="http://schemas.openxmlformats.org/drawingml/2006/main" r:embed="imgId51460556"/>
+          <a:blip xmlns:r="http://schemas.openxmlformats.org/officeDocument/2006/relationships" xmlns:a="http://schemas.openxmlformats.org/drawingml/2006/main" r:embed="imgId56434810"/>
           <a:stretch xmlns:a="http://schemas.openxmlformats.org/drawingml/2006/main">
             <a:fillRect/>
           </a:stretch>

</xml_diff>